<commit_message>
Added Project Update slides for 24Jan18
</commit_message>
<xml_diff>
--- a/SGW Project Update 24Jan18.pptx
+++ b/SGW Project Update 24Jan18.pptx
@@ -4029,7 +4029,7 @@
               <a:defRPr/>
             </a:pPr>
             <a:r>
-              <a:rPr kumimoji="0" lang="en-US" sz="2400" b="1" i="0" u="none" strike="noStrike" kern="1200" cap="none" spc="0" normalizeH="0" baseline="0" noProof="0" dirty="0" smtClean="0">
+              <a:rPr kumimoji="0" lang="en-US" sz="2400" b="1" i="0" u="none" strike="noStrike" kern="1200" cap="none" spc="0" normalizeH="0" baseline="0" noProof="0" smtClean="0">
                 <a:ln>
                   <a:noFill/>
                 </a:ln>
@@ -4044,10 +4044,10 @@
                 <a:uFillTx/>
                 <a:latin typeface="Calibri" panose="020F0502020204030204" pitchFamily="34" charset="0"/>
               </a:rPr>
-              <a:t>MIST7590 – MIT Project</a:t>
+              <a:t>MIST7591E </a:t>
             </a:r>
             <a:r>
-              <a:rPr kumimoji="0" lang="en-US" sz="2400" b="1" i="0" u="none" strike="noStrike" kern="1200" cap="none" spc="0" normalizeH="0" noProof="0" dirty="0" smtClean="0">
+              <a:rPr kumimoji="0" lang="en-US" sz="2400" b="1" i="0" u="none" strike="noStrike" kern="1200" cap="none" spc="0" normalizeH="0" baseline="0" noProof="0" smtClean="0">
                 <a:ln>
                   <a:noFill/>
                 </a:ln>
@@ -4062,7 +4062,79 @@
                 <a:uFillTx/>
                 <a:latin typeface="Calibri" panose="020F0502020204030204" pitchFamily="34" charset="0"/>
               </a:rPr>
-              <a:t> I</a:t>
+              <a:t>– </a:t>
+            </a:r>
+            <a:r>
+              <a:rPr kumimoji="0" lang="en-US" sz="2400" b="1" i="0" u="none" strike="noStrike" kern="1200" cap="none" spc="0" normalizeH="0" baseline="0" noProof="0" smtClean="0">
+                <a:ln>
+                  <a:noFill/>
+                </a:ln>
+                <a:solidFill>
+                  <a:schemeClr val="tx1">
+                    <a:lumMod val="75000"/>
+                    <a:lumOff val="25000"/>
+                  </a:schemeClr>
+                </a:solidFill>
+                <a:effectLst/>
+                <a:uLnTx/>
+                <a:uFillTx/>
+                <a:latin typeface="Calibri" panose="020F0502020204030204" pitchFamily="34" charset="0"/>
+              </a:rPr>
+              <a:t>MBT </a:t>
+            </a:r>
+            <a:r>
+              <a:rPr kumimoji="0" lang="en-US" sz="2400" b="1" i="0" u="none" strike="noStrike" kern="1200" cap="none" spc="0" normalizeH="0" baseline="0" noProof="0" smtClean="0">
+                <a:ln>
+                  <a:noFill/>
+                </a:ln>
+                <a:solidFill>
+                  <a:schemeClr val="tx1">
+                    <a:lumMod val="75000"/>
+                    <a:lumOff val="25000"/>
+                  </a:schemeClr>
+                </a:solidFill>
+                <a:effectLst/>
+                <a:uLnTx/>
+                <a:uFillTx/>
+                <a:latin typeface="Calibri" panose="020F0502020204030204" pitchFamily="34" charset="0"/>
+              </a:rPr>
+              <a:t>Project</a:t>
+            </a:r>
+            <a:r>
+              <a:rPr kumimoji="0" lang="en-US" sz="2400" b="1" i="0" u="none" strike="noStrike" kern="1200" cap="none" spc="0" normalizeH="0" noProof="0" smtClean="0">
+                <a:ln>
+                  <a:noFill/>
+                </a:ln>
+                <a:solidFill>
+                  <a:schemeClr val="tx1">
+                    <a:lumMod val="75000"/>
+                    <a:lumOff val="25000"/>
+                  </a:schemeClr>
+                </a:solidFill>
+                <a:effectLst/>
+                <a:uLnTx/>
+                <a:uFillTx/>
+                <a:latin typeface="Calibri" panose="020F0502020204030204" pitchFamily="34" charset="0"/>
+              </a:rPr>
+              <a:t> </a:t>
+            </a:r>
+            <a:r>
+              <a:rPr kumimoji="0" lang="en-US" sz="2400" b="1" i="0" u="none" strike="noStrike" kern="1200" cap="none" spc="0" normalizeH="0" noProof="0" smtClean="0">
+                <a:ln>
+                  <a:noFill/>
+                </a:ln>
+                <a:solidFill>
+                  <a:schemeClr val="tx1">
+                    <a:lumMod val="75000"/>
+                    <a:lumOff val="25000"/>
+                  </a:schemeClr>
+                </a:solidFill>
+                <a:effectLst/>
+                <a:uLnTx/>
+                <a:uFillTx/>
+                <a:latin typeface="Calibri" panose="020F0502020204030204" pitchFamily="34" charset="0"/>
+              </a:rPr>
+              <a:t>II</a:t>
             </a:r>
             <a:endParaRPr kumimoji="0" lang="en-US" sz="2400" b="1" i="0" u="none" strike="noStrike" kern="1200" cap="none" spc="0" normalizeH="0" baseline="0" noProof="0" dirty="0" smtClean="0">
               <a:ln>
@@ -4485,7 +4557,16 @@
                 </a:solidFill>
                 <a:latin typeface="Calibri" panose="020F0502020204030204" pitchFamily="34" charset="0"/>
               </a:rPr>
-              <a:t>Final Project Update</a:t>
+              <a:t>Project </a:t>
+            </a:r>
+            <a:r>
+              <a:rPr lang="en-US" b="1" dirty="0" smtClean="0">
+                <a:solidFill>
+                  <a:schemeClr val="tx1"/>
+                </a:solidFill>
+                <a:latin typeface="Calibri" panose="020F0502020204030204" pitchFamily="34" charset="0"/>
+              </a:rPr>
+              <a:t>Update</a:t>
             </a:r>
             <a:endParaRPr kumimoji="0" lang="en-US" sz="4400" b="1" i="0" u="none" strike="noStrike" kern="1200" cap="none" spc="0" normalizeH="0" baseline="0" noProof="0" dirty="0">
               <a:ln w="6350">
@@ -4599,7 +4680,6 @@
               <a:rPr lang="en-US" dirty="0" smtClean="0"/>
               <a:t>Continue customizing site content with theme</a:t>
             </a:r>
-            <a:endParaRPr lang="en-US" dirty="0" smtClean="0"/>
           </a:p>
           <a:p>
             <a:pPr>
@@ -4786,21 +4866,18 @@
               <a:rPr lang="en-US" sz="3600" dirty="0" smtClean="0"/>
               <a:t>Project Background</a:t>
             </a:r>
-            <a:endParaRPr lang="en-US" sz="3600" dirty="0" smtClean="0"/>
           </a:p>
           <a:p>
             <a:r>
               <a:rPr lang="en-US" sz="3600" dirty="0" smtClean="0"/>
               <a:t>WordPress Theme Selection</a:t>
             </a:r>
-            <a:endParaRPr lang="en-US" sz="3600" dirty="0" smtClean="0"/>
           </a:p>
           <a:p>
             <a:r>
               <a:rPr lang="en-US" sz="3600" dirty="0" smtClean="0"/>
               <a:t>Available Plugins &amp; Limitations</a:t>
             </a:r>
-            <a:endParaRPr lang="en-US" sz="3600" dirty="0" smtClean="0"/>
           </a:p>
           <a:p>
             <a:r>
@@ -4811,22 +4888,13 @@
           <a:p>
             <a:r>
               <a:rPr lang="en-US" sz="3600" dirty="0" smtClean="0"/>
-              <a:t>Project Schedule</a:t>
+              <a:t>Project Schedule </a:t>
             </a:r>
+          </a:p>
+          <a:p>
             <a:r>
               <a:rPr lang="en-US" sz="3600" dirty="0" smtClean="0"/>
-              <a:t> </a:t>
-            </a:r>
-            <a:endParaRPr lang="en-US" sz="3600" dirty="0" smtClean="0"/>
-          </a:p>
-          <a:p>
-            <a:r>
-              <a:rPr lang="en-US" sz="3600" dirty="0" smtClean="0"/>
-              <a:t>Way </a:t>
-            </a:r>
-            <a:r>
-              <a:rPr lang="en-US" sz="3600" dirty="0" smtClean="0"/>
-              <a:t>Ahead</a:t>
+              <a:t>Way Ahead</a:t>
             </a:r>
           </a:p>
         </p:txBody>
@@ -4891,11 +4959,7 @@
             <a:pPr algn="l"/>
             <a:r>
               <a:rPr lang="en-US" b="1" dirty="0" smtClean="0"/>
-              <a:t>Project </a:t>
-            </a:r>
-            <a:r>
-              <a:rPr lang="en-US" b="1" dirty="0" smtClean="0"/>
-              <a:t>Background</a:t>
+              <a:t>Project Background</a:t>
             </a:r>
             <a:endParaRPr lang="en-US" b="1" dirty="0"/>
           </a:p>
@@ -5325,7 +5389,6 @@
               <a:rPr lang="en-US" dirty="0" smtClean="0"/>
               <a:t>Negative impact to Volunteer App &amp; Reports App</a:t>
             </a:r>
-            <a:endParaRPr lang="en-US" dirty="0" smtClean="0"/>
           </a:p>
           <a:p>
             <a:pPr>

</xml_diff>

<commit_message>
Updated slides for Project Update 24Jan18
</commit_message>
<xml_diff>
--- a/SGW Project Update 24Jan18.pptx
+++ b/SGW Project Update 24Jan18.pptx
@@ -5,21 +5,24 @@
     <p:sldMasterId id="2147483648" r:id="rId1"/>
   </p:sldMasterIdLst>
   <p:notesMasterIdLst>
-    <p:notesMasterId r:id="rId14"/>
+    <p:notesMasterId r:id="rId17"/>
   </p:notesMasterIdLst>
   <p:sldIdLst>
     <p:sldId id="256" r:id="rId2"/>
     <p:sldId id="299" r:id="rId3"/>
     <p:sldId id="258" r:id="rId4"/>
     <p:sldId id="297" r:id="rId5"/>
-    <p:sldId id="309" r:id="rId6"/>
-    <p:sldId id="310" r:id="rId7"/>
-    <p:sldId id="311" r:id="rId8"/>
-    <p:sldId id="313" r:id="rId9"/>
-    <p:sldId id="312" r:id="rId10"/>
-    <p:sldId id="289" r:id="rId11"/>
-    <p:sldId id="264" r:id="rId12"/>
-    <p:sldId id="266" r:id="rId13"/>
+    <p:sldId id="315" r:id="rId6"/>
+    <p:sldId id="316" r:id="rId7"/>
+    <p:sldId id="314" r:id="rId8"/>
+    <p:sldId id="309" r:id="rId9"/>
+    <p:sldId id="310" r:id="rId10"/>
+    <p:sldId id="311" r:id="rId11"/>
+    <p:sldId id="313" r:id="rId12"/>
+    <p:sldId id="312" r:id="rId13"/>
+    <p:sldId id="289" r:id="rId14"/>
+    <p:sldId id="264" r:id="rId15"/>
+    <p:sldId id="266" r:id="rId16"/>
   </p:sldIdLst>
   <p:sldSz cx="9144000" cy="6858000" type="screen4x3"/>
   <p:notesSz cx="6954838" cy="9240838"/>
@@ -203,7 +206,7 @@
           <a:p>
             <a:fld id="{F5E77B19-4C30-44B4-BD0B-CE34772B3C65}" type="datetimeFigureOut">
               <a:rPr lang="en-US" smtClean="0"/>
-              <a:t>1/21/2018</a:t>
+              <a:t>1/24/2018</a:t>
             </a:fld>
             <a:endParaRPr lang="en-US" dirty="0"/>
           </a:p>
@@ -516,11 +519,11 @@
           <a:lstStyle/>
           <a:p>
             <a:r>
-              <a:rPr lang="en-US" b="1" dirty="0" smtClean="0"/>
+              <a:rPr lang="en-US" sz="1400" b="1" dirty="0" smtClean="0"/>
               <a:t>Criteria</a:t>
             </a:r>
             <a:r>
-              <a:rPr lang="en-US" b="1" baseline="0" dirty="0" smtClean="0"/>
+              <a:rPr lang="en-US" sz="1400" b="1" baseline="0" dirty="0" smtClean="0"/>
               <a:t> for website hosting:</a:t>
             </a:r>
           </a:p>
@@ -529,7 +532,7 @@
               <a:buAutoNum type="arabicPeriod"/>
             </a:pPr>
             <a:r>
-              <a:rPr lang="en-US" baseline="0" dirty="0" smtClean="0"/>
+              <a:rPr lang="en-US" sz="1400" baseline="0" dirty="0" smtClean="0"/>
               <a:t>Code must be accessible and portable</a:t>
             </a:r>
           </a:p>
@@ -538,7 +541,7 @@
               <a:buAutoNum type="arabicPeriod"/>
             </a:pPr>
             <a:r>
-              <a:rPr lang="en-US" baseline="0" dirty="0" smtClean="0"/>
+              <a:rPr lang="en-US" sz="1400" baseline="0" dirty="0" smtClean="0"/>
               <a:t>Cost must be below $20</a:t>
             </a:r>
           </a:p>
@@ -547,10 +550,10 @@
               <a:buAutoNum type="arabicPeriod"/>
             </a:pPr>
             <a:r>
-              <a:rPr lang="en-US" baseline="0" dirty="0" smtClean="0"/>
+              <a:rPr lang="en-US" sz="1400" baseline="0" dirty="0" smtClean="0"/>
               <a:t>Site security must be include SiteLock and SSL Certificate</a:t>
             </a:r>
-            <a:endParaRPr lang="en-US" dirty="0"/>
+            <a:endParaRPr lang="en-US" sz="1400" dirty="0"/>
           </a:p>
         </p:txBody>
       </p:sp>
@@ -634,59 +637,38 @@
           <a:bodyPr/>
           <a:lstStyle/>
           <a:p>
+            <a:pPr marL="182880" indent="-182880">
+              <a:buFont typeface="Calibri" panose="020F0502020204030204" pitchFamily="34" charset="0"/>
+              <a:buChar char="―"/>
+            </a:pPr>
             <a:r>
-              <a:rPr lang="en-US" dirty="0" smtClean="0"/>
-              <a:t>Train all team members on WordPress &amp; PHP</a:t>
+              <a:rPr lang="en-US" sz="1400" dirty="0" smtClean="0"/>
+              <a:t>One of the great things about WordPress is the ability for developers to extend the core functionality of the code base to do just about anything you can think of.  So we've got WordPress Core, and that's a stable code base that you can use as a platform to build your site. If you need to add custom features or functionality, instead of directly editing WordPress Core, you use plugins. </a:t>
             </a:r>
           </a:p>
           <a:p>
-            <a:pPr lvl="1"/>
+            <a:pPr marL="182880" indent="-182880">
+              <a:buFont typeface="Calibri" panose="020F0502020204030204" pitchFamily="34" charset="0"/>
+              <a:buChar char="―"/>
+            </a:pPr>
+            <a:endParaRPr lang="en-US" sz="1400" dirty="0" smtClean="0"/>
+          </a:p>
+          <a:p>
+            <a:pPr marL="182880" indent="-182880">
+              <a:buFont typeface="Calibri" panose="020F0502020204030204" pitchFamily="34" charset="0"/>
+              <a:buChar char="―"/>
+            </a:pPr>
             <a:r>
-              <a:rPr lang="en-US" dirty="0" smtClean="0"/>
-              <a:t>Tutorials by LearnWebCode &amp; Lynda.com</a:t>
+              <a:rPr lang="en-US" sz="1400" dirty="0" smtClean="0"/>
+              <a:t>WordPress also gives us a way to change the appearance of a website, and that's done through themes. So we've got themes and plugins, where themes control the look of a site and plugins control any site-specific functionality that's needed in addition to WordPress Core.</a:t>
             </a:r>
           </a:p>
           <a:p>
-            <a:endParaRPr lang="en-US" dirty="0" smtClean="0"/>
-          </a:p>
-          <a:p>
-            <a:r>
-              <a:rPr lang="en-US" dirty="0" smtClean="0"/>
-              <a:t>Assign site rebuilding tasks to each team member; rebuild is consisted of 3 parts</a:t>
-            </a:r>
-          </a:p>
-          <a:p>
-            <a:pPr lvl="1"/>
-            <a:r>
-              <a:rPr lang="en-US" dirty="0" smtClean="0"/>
-              <a:t>Main SGW Website</a:t>
-            </a:r>
-          </a:p>
-          <a:p>
-            <a:pPr lvl="1"/>
-            <a:r>
-              <a:rPr lang="en-US" dirty="0" smtClean="0"/>
-              <a:t>Volunteer Hours Log App</a:t>
-            </a:r>
-          </a:p>
-          <a:p>
-            <a:pPr lvl="1"/>
-            <a:r>
-              <a:rPr lang="en-US" dirty="0" smtClean="0"/>
-              <a:t>Volunteer Reports App (Secondary site)</a:t>
-            </a:r>
-          </a:p>
-          <a:p>
-            <a:endParaRPr lang="en-US" dirty="0" smtClean="0"/>
-          </a:p>
-          <a:p>
-            <a:r>
-              <a:rPr lang="en-US" dirty="0" smtClean="0"/>
-              <a:t>Begin rebuilding website in December</a:t>
-            </a:r>
-          </a:p>
-          <a:p>
-            <a:endParaRPr lang="en-US" dirty="0"/>
+            <a:pPr marL="182880" indent="-182880">
+              <a:buFont typeface="Calibri" panose="020F0502020204030204" pitchFamily="34" charset="0"/>
+              <a:buChar char="―"/>
+            </a:pPr>
+            <a:endParaRPr lang="en-US" sz="1400" dirty="0" smtClean="0"/>
           </a:p>
         </p:txBody>
       </p:sp>
@@ -707,7 +689,413 @@
           <a:p>
             <a:fld id="{EC08C6C5-DD63-4A3D-AD22-7D6D36F6A3FB}" type="slidenum">
               <a:rPr lang="en-US" smtClean="0"/>
-              <a:t>11</a:t>
+              <a:t>4</a:t>
+            </a:fld>
+            <a:endParaRPr lang="en-US" dirty="0"/>
+          </a:p>
+        </p:txBody>
+      </p:sp>
+    </p:spTree>
+    <p:extLst>
+      <p:ext uri="{BB962C8B-B14F-4D97-AF65-F5344CB8AC3E}">
+        <p14:creationId xmlns:p14="http://schemas.microsoft.com/office/powerpoint/2010/main" val="2766747829"/>
+      </p:ext>
+    </p:extLst>
+  </p:cSld>
+  <p:clrMapOvr>
+    <a:masterClrMapping/>
+  </p:clrMapOvr>
+</p:notes>
+</file>
+
+<file path=ppt/notesSlides/notesSlide3.xml><?xml version="1.0" encoding="utf-8"?>
+<p:notes xmlns:a="http://schemas.openxmlformats.org/drawingml/2006/main" xmlns:r="http://schemas.openxmlformats.org/officeDocument/2006/relationships" xmlns:p="http://schemas.openxmlformats.org/presentationml/2006/main">
+  <p:cSld>
+    <p:spTree>
+      <p:nvGrpSpPr>
+        <p:cNvPr id="1" name=""/>
+        <p:cNvGrpSpPr/>
+        <p:nvPr/>
+      </p:nvGrpSpPr>
+      <p:grpSpPr>
+        <a:xfrm>
+          <a:off x="0" y="0"/>
+          <a:ext cx="0" cy="0"/>
+          <a:chOff x="0" y="0"/>
+          <a:chExt cx="0" cy="0"/>
+        </a:xfrm>
+      </p:grpSpPr>
+      <p:sp>
+        <p:nvSpPr>
+          <p:cNvPr id="2" name="Slide Image Placeholder 1"/>
+          <p:cNvSpPr>
+            <a:spLocks noGrp="1" noRot="1" noChangeAspect="1"/>
+          </p:cNvSpPr>
+          <p:nvPr>
+            <p:ph type="sldImg"/>
+          </p:nvPr>
+        </p:nvSpPr>
+        <p:spPr/>
+      </p:sp>
+      <p:sp>
+        <p:nvSpPr>
+          <p:cNvPr id="3" name="Notes Placeholder 2"/>
+          <p:cNvSpPr>
+            <a:spLocks noGrp="1"/>
+          </p:cNvSpPr>
+          <p:nvPr>
+            <p:ph type="body" idx="1"/>
+          </p:nvPr>
+        </p:nvSpPr>
+        <p:spPr/>
+        <p:txBody>
+          <a:bodyPr/>
+          <a:lstStyle/>
+          <a:p>
+            <a:pPr marL="171450" indent="-171450">
+              <a:buFont typeface="Calibri" panose="020F0502020204030204" pitchFamily="34" charset="0"/>
+              <a:buChar char="―"/>
+            </a:pPr>
+            <a:r>
+              <a:rPr lang="en-US" sz="1400" dirty="0" smtClean="0"/>
+              <a:t>The available plugins have</a:t>
+            </a:r>
+            <a:r>
+              <a:rPr lang="en-US" sz="1400" baseline="0" dirty="0" smtClean="0"/>
+              <a:t> some limitations.  Since WP uses a built-in database that is established during the initial setup, it prevents you from altering the DB table structure.  Some plugins add their own tables to the WP DB.</a:t>
+            </a:r>
+          </a:p>
+          <a:p>
+            <a:pPr marL="171450" indent="-171450">
+              <a:buFont typeface="Calibri" panose="020F0502020204030204" pitchFamily="34" charset="0"/>
+              <a:buChar char="―"/>
+            </a:pPr>
+            <a:endParaRPr lang="en-US" sz="1400" dirty="0"/>
+          </a:p>
+        </p:txBody>
+      </p:sp>
+      <p:sp>
+        <p:nvSpPr>
+          <p:cNvPr id="4" name="Slide Number Placeholder 3"/>
+          <p:cNvSpPr>
+            <a:spLocks noGrp="1"/>
+          </p:cNvSpPr>
+          <p:nvPr>
+            <p:ph type="sldNum" sz="quarter" idx="10"/>
+          </p:nvPr>
+        </p:nvSpPr>
+        <p:spPr/>
+        <p:txBody>
+          <a:bodyPr/>
+          <a:lstStyle/>
+          <a:p>
+            <a:fld id="{EC08C6C5-DD63-4A3D-AD22-7D6D36F6A3FB}" type="slidenum">
+              <a:rPr lang="en-US" smtClean="0"/>
+              <a:t>8</a:t>
+            </a:fld>
+            <a:endParaRPr lang="en-US" dirty="0"/>
+          </a:p>
+        </p:txBody>
+      </p:sp>
+    </p:spTree>
+    <p:extLst>
+      <p:ext uri="{BB962C8B-B14F-4D97-AF65-F5344CB8AC3E}">
+        <p14:creationId xmlns:p14="http://schemas.microsoft.com/office/powerpoint/2010/main" val="569184695"/>
+      </p:ext>
+    </p:extLst>
+  </p:cSld>
+  <p:clrMapOvr>
+    <a:masterClrMapping/>
+  </p:clrMapOvr>
+</p:notes>
+</file>
+
+<file path=ppt/notesSlides/notesSlide4.xml><?xml version="1.0" encoding="utf-8"?>
+<p:notes xmlns:a="http://schemas.openxmlformats.org/drawingml/2006/main" xmlns:r="http://schemas.openxmlformats.org/officeDocument/2006/relationships" xmlns:p="http://schemas.openxmlformats.org/presentationml/2006/main">
+  <p:cSld>
+    <p:spTree>
+      <p:nvGrpSpPr>
+        <p:cNvPr id="1" name=""/>
+        <p:cNvGrpSpPr/>
+        <p:nvPr/>
+      </p:nvGrpSpPr>
+      <p:grpSpPr>
+        <a:xfrm>
+          <a:off x="0" y="0"/>
+          <a:ext cx="0" cy="0"/>
+          <a:chOff x="0" y="0"/>
+          <a:chExt cx="0" cy="0"/>
+        </a:xfrm>
+      </p:grpSpPr>
+      <p:sp>
+        <p:nvSpPr>
+          <p:cNvPr id="2" name="Slide Image Placeholder 1"/>
+          <p:cNvSpPr>
+            <a:spLocks noGrp="1" noRot="1" noChangeAspect="1"/>
+          </p:cNvSpPr>
+          <p:nvPr>
+            <p:ph type="sldImg"/>
+          </p:nvPr>
+        </p:nvSpPr>
+        <p:spPr/>
+      </p:sp>
+      <p:sp>
+        <p:nvSpPr>
+          <p:cNvPr id="3" name="Notes Placeholder 2"/>
+          <p:cNvSpPr>
+            <a:spLocks noGrp="1"/>
+          </p:cNvSpPr>
+          <p:nvPr>
+            <p:ph type="body" idx="1"/>
+          </p:nvPr>
+        </p:nvSpPr>
+        <p:spPr/>
+        <p:txBody>
+          <a:bodyPr/>
+          <a:lstStyle/>
+          <a:p>
+            <a:endParaRPr lang="en-US" sz="1400" dirty="0"/>
+          </a:p>
+        </p:txBody>
+      </p:sp>
+      <p:sp>
+        <p:nvSpPr>
+          <p:cNvPr id="4" name="Slide Number Placeholder 3"/>
+          <p:cNvSpPr>
+            <a:spLocks noGrp="1"/>
+          </p:cNvSpPr>
+          <p:nvPr>
+            <p:ph type="sldNum" sz="quarter" idx="10"/>
+          </p:nvPr>
+        </p:nvSpPr>
+        <p:spPr/>
+        <p:txBody>
+          <a:bodyPr/>
+          <a:lstStyle/>
+          <a:p>
+            <a:fld id="{EC08C6C5-DD63-4A3D-AD22-7D6D36F6A3FB}" type="slidenum">
+              <a:rPr lang="en-US" smtClean="0"/>
+              <a:t>9</a:t>
+            </a:fld>
+            <a:endParaRPr lang="en-US" dirty="0"/>
+          </a:p>
+        </p:txBody>
+      </p:sp>
+    </p:spTree>
+    <p:extLst>
+      <p:ext uri="{BB962C8B-B14F-4D97-AF65-F5344CB8AC3E}">
+        <p14:creationId xmlns:p14="http://schemas.microsoft.com/office/powerpoint/2010/main" val="1959515886"/>
+      </p:ext>
+    </p:extLst>
+  </p:cSld>
+  <p:clrMapOvr>
+    <a:masterClrMapping/>
+  </p:clrMapOvr>
+</p:notes>
+</file>
+
+<file path=ppt/notesSlides/notesSlide5.xml><?xml version="1.0" encoding="utf-8"?>
+<p:notes xmlns:a="http://schemas.openxmlformats.org/drawingml/2006/main" xmlns:r="http://schemas.openxmlformats.org/officeDocument/2006/relationships" xmlns:p="http://schemas.openxmlformats.org/presentationml/2006/main">
+  <p:cSld>
+    <p:spTree>
+      <p:nvGrpSpPr>
+        <p:cNvPr id="1" name=""/>
+        <p:cNvGrpSpPr/>
+        <p:nvPr/>
+      </p:nvGrpSpPr>
+      <p:grpSpPr>
+        <a:xfrm>
+          <a:off x="0" y="0"/>
+          <a:ext cx="0" cy="0"/>
+          <a:chOff x="0" y="0"/>
+          <a:chExt cx="0" cy="0"/>
+        </a:xfrm>
+      </p:grpSpPr>
+      <p:sp>
+        <p:nvSpPr>
+          <p:cNvPr id="2" name="Slide Image Placeholder 1"/>
+          <p:cNvSpPr>
+            <a:spLocks noGrp="1" noRot="1" noChangeAspect="1"/>
+          </p:cNvSpPr>
+          <p:nvPr>
+            <p:ph type="sldImg"/>
+          </p:nvPr>
+        </p:nvSpPr>
+        <p:spPr/>
+      </p:sp>
+      <p:sp>
+        <p:nvSpPr>
+          <p:cNvPr id="3" name="Notes Placeholder 2"/>
+          <p:cNvSpPr>
+            <a:spLocks noGrp="1"/>
+          </p:cNvSpPr>
+          <p:nvPr>
+            <p:ph type="body" idx="1"/>
+          </p:nvPr>
+        </p:nvSpPr>
+        <p:spPr/>
+        <p:txBody>
+          <a:bodyPr/>
+          <a:lstStyle/>
+          <a:p>
+            <a:endParaRPr lang="en-US" dirty="0"/>
+          </a:p>
+        </p:txBody>
+      </p:sp>
+      <p:sp>
+        <p:nvSpPr>
+          <p:cNvPr id="4" name="Slide Number Placeholder 3"/>
+          <p:cNvSpPr>
+            <a:spLocks noGrp="1"/>
+          </p:cNvSpPr>
+          <p:nvPr>
+            <p:ph type="sldNum" sz="quarter" idx="10"/>
+          </p:nvPr>
+        </p:nvSpPr>
+        <p:spPr/>
+        <p:txBody>
+          <a:bodyPr/>
+          <a:lstStyle/>
+          <a:p>
+            <a:fld id="{EC08C6C5-DD63-4A3D-AD22-7D6D36F6A3FB}" type="slidenum">
+              <a:rPr lang="en-US" smtClean="0"/>
+              <a:t>10</a:t>
+            </a:fld>
+            <a:endParaRPr lang="en-US" dirty="0"/>
+          </a:p>
+        </p:txBody>
+      </p:sp>
+    </p:spTree>
+    <p:extLst>
+      <p:ext uri="{BB962C8B-B14F-4D97-AF65-F5344CB8AC3E}">
+        <p14:creationId xmlns:p14="http://schemas.microsoft.com/office/powerpoint/2010/main" val="470150497"/>
+      </p:ext>
+    </p:extLst>
+  </p:cSld>
+  <p:clrMapOvr>
+    <a:masterClrMapping/>
+  </p:clrMapOvr>
+</p:notes>
+</file>
+
+<file path=ppt/notesSlides/notesSlide6.xml><?xml version="1.0" encoding="utf-8"?>
+<p:notes xmlns:a="http://schemas.openxmlformats.org/drawingml/2006/main" xmlns:r="http://schemas.openxmlformats.org/officeDocument/2006/relationships" xmlns:p="http://schemas.openxmlformats.org/presentationml/2006/main">
+  <p:cSld>
+    <p:spTree>
+      <p:nvGrpSpPr>
+        <p:cNvPr id="1" name=""/>
+        <p:cNvGrpSpPr/>
+        <p:nvPr/>
+      </p:nvGrpSpPr>
+      <p:grpSpPr>
+        <a:xfrm>
+          <a:off x="0" y="0"/>
+          <a:ext cx="0" cy="0"/>
+          <a:chOff x="0" y="0"/>
+          <a:chExt cx="0" cy="0"/>
+        </a:xfrm>
+      </p:grpSpPr>
+      <p:sp>
+        <p:nvSpPr>
+          <p:cNvPr id="2" name="Slide Image Placeholder 1"/>
+          <p:cNvSpPr>
+            <a:spLocks noGrp="1" noRot="1" noChangeAspect="1"/>
+          </p:cNvSpPr>
+          <p:nvPr>
+            <p:ph type="sldImg"/>
+          </p:nvPr>
+        </p:nvSpPr>
+        <p:spPr/>
+      </p:sp>
+      <p:sp>
+        <p:nvSpPr>
+          <p:cNvPr id="3" name="Notes Placeholder 2"/>
+          <p:cNvSpPr>
+            <a:spLocks noGrp="1"/>
+          </p:cNvSpPr>
+          <p:nvPr>
+            <p:ph type="body" idx="1"/>
+          </p:nvPr>
+        </p:nvSpPr>
+        <p:spPr/>
+        <p:txBody>
+          <a:bodyPr/>
+          <a:lstStyle/>
+          <a:p>
+            <a:r>
+              <a:rPr lang="en-US" dirty="0" smtClean="0"/>
+              <a:t>Train all team members on WordPress &amp; PHP</a:t>
+            </a:r>
+          </a:p>
+          <a:p>
+            <a:pPr lvl="1"/>
+            <a:r>
+              <a:rPr lang="en-US" dirty="0" smtClean="0"/>
+              <a:t>Tutorials by LearnWebCode &amp; Lynda.com</a:t>
+            </a:r>
+          </a:p>
+          <a:p>
+            <a:endParaRPr lang="en-US" dirty="0" smtClean="0"/>
+          </a:p>
+          <a:p>
+            <a:r>
+              <a:rPr lang="en-US" dirty="0" smtClean="0"/>
+              <a:t>Assign site rebuilding tasks to each team member; rebuild is consisted of 3 parts</a:t>
+            </a:r>
+          </a:p>
+          <a:p>
+            <a:pPr lvl="1"/>
+            <a:r>
+              <a:rPr lang="en-US" dirty="0" smtClean="0"/>
+              <a:t>Main SGW Website</a:t>
+            </a:r>
+          </a:p>
+          <a:p>
+            <a:pPr lvl="1"/>
+            <a:r>
+              <a:rPr lang="en-US" dirty="0" smtClean="0"/>
+              <a:t>Volunteer Hours Log App</a:t>
+            </a:r>
+          </a:p>
+          <a:p>
+            <a:pPr lvl="1"/>
+            <a:r>
+              <a:rPr lang="en-US" dirty="0" smtClean="0"/>
+              <a:t>Volunteer Reports App (Secondary site)</a:t>
+            </a:r>
+          </a:p>
+          <a:p>
+            <a:endParaRPr lang="en-US" dirty="0" smtClean="0"/>
+          </a:p>
+          <a:p>
+            <a:r>
+              <a:rPr lang="en-US" dirty="0" smtClean="0"/>
+              <a:t>Begin rebuilding website in December</a:t>
+            </a:r>
+          </a:p>
+          <a:p>
+            <a:endParaRPr lang="en-US" dirty="0"/>
+          </a:p>
+        </p:txBody>
+      </p:sp>
+      <p:sp>
+        <p:nvSpPr>
+          <p:cNvPr id="4" name="Slide Number Placeholder 3"/>
+          <p:cNvSpPr>
+            <a:spLocks noGrp="1"/>
+          </p:cNvSpPr>
+          <p:nvPr>
+            <p:ph type="sldNum" sz="quarter" idx="10"/>
+          </p:nvPr>
+        </p:nvSpPr>
+        <p:spPr/>
+        <p:txBody>
+          <a:bodyPr/>
+          <a:lstStyle/>
+          <a:p>
+            <a:fld id="{EC08C6C5-DD63-4A3D-AD22-7D6D36F6A3FB}" type="slidenum">
+              <a:rPr lang="en-US" smtClean="0"/>
+              <a:t>14</a:t>
             </a:fld>
             <a:endParaRPr lang="en-US" dirty="0"/>
           </a:p>
@@ -907,7 +1295,7 @@
           <a:p>
             <a:fld id="{14973A1A-3B12-4F13-9E45-4B4F2CF06D13}" type="datetimeFigureOut">
               <a:rPr lang="en-US" smtClean="0"/>
-              <a:t>1/21/2018</a:t>
+              <a:t>1/24/2018</a:t>
             </a:fld>
             <a:endParaRPr lang="en-US" dirty="0"/>
           </a:p>
@@ -1118,7 +1506,7 @@
           <a:p>
             <a:fld id="{14973A1A-3B12-4F13-9E45-4B4F2CF06D13}" type="datetimeFigureOut">
               <a:rPr lang="en-US" smtClean="0"/>
-              <a:t>1/21/2018</a:t>
+              <a:t>1/24/2018</a:t>
             </a:fld>
             <a:endParaRPr lang="en-US" dirty="0"/>
           </a:p>
@@ -1298,7 +1686,7 @@
           <a:p>
             <a:fld id="{14973A1A-3B12-4F13-9E45-4B4F2CF06D13}" type="datetimeFigureOut">
               <a:rPr lang="en-US" smtClean="0"/>
-              <a:t>1/21/2018</a:t>
+              <a:t>1/24/2018</a:t>
             </a:fld>
             <a:endParaRPr lang="en-US" dirty="0"/>
           </a:p>
@@ -1468,7 +1856,7 @@
           <a:p>
             <a:fld id="{14973A1A-3B12-4F13-9E45-4B4F2CF06D13}" type="datetimeFigureOut">
               <a:rPr lang="en-US" smtClean="0"/>
-              <a:t>1/21/2018</a:t>
+              <a:t>1/24/2018</a:t>
             </a:fld>
             <a:endParaRPr lang="en-US" dirty="0"/>
           </a:p>
@@ -1755,7 +2143,7 @@
           <a:p>
             <a:fld id="{14973A1A-3B12-4F13-9E45-4B4F2CF06D13}" type="datetimeFigureOut">
               <a:rPr lang="en-US" smtClean="0"/>
-              <a:t>1/21/2018</a:t>
+              <a:t>1/24/2018</a:t>
             </a:fld>
             <a:endParaRPr lang="en-US" dirty="0"/>
           </a:p>
@@ -2043,7 +2431,7 @@
           <a:p>
             <a:fld id="{14973A1A-3B12-4F13-9E45-4B4F2CF06D13}" type="datetimeFigureOut">
               <a:rPr lang="en-US" smtClean="0"/>
-              <a:t>1/21/2018</a:t>
+              <a:t>1/24/2018</a:t>
             </a:fld>
             <a:endParaRPr lang="en-US" dirty="0"/>
           </a:p>
@@ -2465,7 +2853,7 @@
           <a:p>
             <a:fld id="{14973A1A-3B12-4F13-9E45-4B4F2CF06D13}" type="datetimeFigureOut">
               <a:rPr lang="en-US" smtClean="0"/>
-              <a:t>1/21/2018</a:t>
+              <a:t>1/24/2018</a:t>
             </a:fld>
             <a:endParaRPr lang="en-US" dirty="0"/>
           </a:p>
@@ -2583,7 +2971,7 @@
           <a:p>
             <a:fld id="{14973A1A-3B12-4F13-9E45-4B4F2CF06D13}" type="datetimeFigureOut">
               <a:rPr lang="en-US" smtClean="0"/>
-              <a:t>1/21/2018</a:t>
+              <a:t>1/24/2018</a:t>
             </a:fld>
             <a:endParaRPr lang="en-US" dirty="0"/>
           </a:p>
@@ -2678,7 +3066,7 @@
           <a:p>
             <a:fld id="{14973A1A-3B12-4F13-9E45-4B4F2CF06D13}" type="datetimeFigureOut">
               <a:rPr lang="en-US" smtClean="0"/>
-              <a:t>1/21/2018</a:t>
+              <a:t>1/24/2018</a:t>
             </a:fld>
             <a:endParaRPr lang="en-US" dirty="0"/>
           </a:p>
@@ -2955,7 +3343,7 @@
           <a:p>
             <a:fld id="{14973A1A-3B12-4F13-9E45-4B4F2CF06D13}" type="datetimeFigureOut">
               <a:rPr lang="en-US" smtClean="0"/>
-              <a:t>1/21/2018</a:t>
+              <a:t>1/24/2018</a:t>
             </a:fld>
             <a:endParaRPr lang="en-US" dirty="0"/>
           </a:p>
@@ -3208,7 +3596,7 @@
           <a:p>
             <a:fld id="{14973A1A-3B12-4F13-9E45-4B4F2CF06D13}" type="datetimeFigureOut">
               <a:rPr lang="en-US" smtClean="0"/>
-              <a:t>1/21/2018</a:t>
+              <a:t>1/24/2018</a:t>
             </a:fld>
             <a:endParaRPr lang="en-US" dirty="0"/>
           </a:p>
@@ -3431,7 +3819,7 @@
           <a:p>
             <a:fld id="{14973A1A-3B12-4F13-9E45-4B4F2CF06D13}" type="datetimeFigureOut">
               <a:rPr lang="en-US" smtClean="0"/>
-              <a:t>1/21/2018</a:t>
+              <a:t>1/24/2018</a:t>
             </a:fld>
             <a:endParaRPr lang="en-US" dirty="0"/>
           </a:p>
@@ -4524,6 +4912,604 @@
 </file>
 
 <file path=ppt/slides/slide10.xml><?xml version="1.0" encoding="utf-8"?>
+<p:sld xmlns:a="http://schemas.openxmlformats.org/drawingml/2006/main" xmlns:r="http://schemas.openxmlformats.org/officeDocument/2006/relationships" xmlns:p="http://schemas.openxmlformats.org/presentationml/2006/main">
+  <p:cSld>
+    <p:spTree>
+      <p:nvGrpSpPr>
+        <p:cNvPr id="1" name=""/>
+        <p:cNvGrpSpPr/>
+        <p:nvPr/>
+      </p:nvGrpSpPr>
+      <p:grpSpPr>
+        <a:xfrm>
+          <a:off x="0" y="0"/>
+          <a:ext cx="0" cy="0"/>
+          <a:chOff x="0" y="0"/>
+          <a:chExt cx="0" cy="0"/>
+        </a:xfrm>
+      </p:grpSpPr>
+      <p:sp>
+        <p:nvSpPr>
+          <p:cNvPr id="2" name="Title 1"/>
+          <p:cNvSpPr>
+            <a:spLocks noGrp="1"/>
+          </p:cNvSpPr>
+          <p:nvPr>
+            <p:ph type="title"/>
+          </p:nvPr>
+        </p:nvSpPr>
+        <p:spPr>
+          <a:xfrm>
+            <a:off x="457200" y="76200"/>
+            <a:ext cx="7772400" cy="990600"/>
+          </a:xfrm>
+        </p:spPr>
+        <p:txBody>
+          <a:bodyPr/>
+          <a:lstStyle/>
+          <a:p>
+            <a:pPr algn="l"/>
+            <a:r>
+              <a:rPr lang="en-US" b="1" dirty="0" smtClean="0"/>
+              <a:t>Alt. Solution to Volunteer App</a:t>
+            </a:r>
+            <a:endParaRPr lang="en-US" b="1" dirty="0"/>
+          </a:p>
+        </p:txBody>
+      </p:sp>
+      <p:sp>
+        <p:nvSpPr>
+          <p:cNvPr id="3" name="Content Placeholder 2"/>
+          <p:cNvSpPr>
+            <a:spLocks noGrp="1"/>
+          </p:cNvSpPr>
+          <p:nvPr>
+            <p:ph idx="1"/>
+          </p:nvPr>
+        </p:nvSpPr>
+        <p:spPr>
+          <a:xfrm>
+            <a:off x="533400" y="838200"/>
+            <a:ext cx="8153400" cy="4724400"/>
+          </a:xfrm>
+        </p:spPr>
+        <p:txBody>
+          <a:bodyPr>
+            <a:normAutofit/>
+          </a:bodyPr>
+          <a:lstStyle/>
+          <a:p>
+            <a:pPr>
+              <a:spcBef>
+                <a:spcPts val="0"/>
+              </a:spcBef>
+            </a:pPr>
+            <a:r>
+              <a:rPr lang="en-US" sz="2800" dirty="0" smtClean="0"/>
+              <a:t>Added Section Field for Hardman Farm &amp; </a:t>
+            </a:r>
+            <a:r>
+              <a:rPr lang="en-US" sz="2800" dirty="0" smtClean="0"/>
+              <a:t>SGW</a:t>
+            </a:r>
+          </a:p>
+          <a:p>
+            <a:pPr>
+              <a:spcBef>
+                <a:spcPts val="0"/>
+              </a:spcBef>
+            </a:pPr>
+            <a:r>
+              <a:rPr lang="en-US" sz="2800" dirty="0" smtClean="0"/>
+              <a:t>Added Navigation Bar &amp; Login Name</a:t>
+            </a:r>
+            <a:endParaRPr lang="en-US" sz="2800" dirty="0"/>
+          </a:p>
+        </p:txBody>
+      </p:sp>
+      <p:pic>
+        <p:nvPicPr>
+          <p:cNvPr id="3074" name="Picture 2"/>
+          <p:cNvPicPr>
+            <a:picLocks noChangeAspect="1" noChangeArrowheads="1"/>
+          </p:cNvPicPr>
+          <p:nvPr/>
+        </p:nvPicPr>
+        <p:blipFill>
+          <a:blip r:embed="rId3">
+            <a:extLst>
+              <a:ext uri="{28A0092B-C50C-407E-A947-70E740481C1C}">
+                <a14:useLocalDpi xmlns:a14="http://schemas.microsoft.com/office/drawing/2010/main" val="0"/>
+              </a:ext>
+            </a:extLst>
+          </a:blip>
+          <a:srcRect/>
+          <a:stretch>
+            <a:fillRect/>
+          </a:stretch>
+        </p:blipFill>
+        <p:spPr bwMode="auto">
+          <a:xfrm>
+            <a:off x="76200" y="1726495"/>
+            <a:ext cx="8991600" cy="5055306"/>
+          </a:xfrm>
+          <a:prstGeom prst="rect">
+            <a:avLst/>
+          </a:prstGeom>
+          <a:noFill/>
+          <a:ln>
+            <a:noFill/>
+          </a:ln>
+          <a:extLst>
+            <a:ext uri="{909E8E84-426E-40DD-AFC4-6F175D3DCCD1}">
+              <a14:hiddenFill xmlns:a14="http://schemas.microsoft.com/office/drawing/2010/main">
+                <a:solidFill>
+                  <a:schemeClr val="accent1"/>
+                </a:solidFill>
+              </a14:hiddenFill>
+            </a:ext>
+            <a:ext uri="{91240B29-F687-4F45-9708-019B960494DF}">
+              <a14:hiddenLine xmlns:a14="http://schemas.microsoft.com/office/drawing/2010/main" w="9525">
+                <a:solidFill>
+                  <a:schemeClr val="tx1"/>
+                </a:solidFill>
+                <a:miter lim="800000"/>
+                <a:headEnd/>
+                <a:tailEnd/>
+              </a14:hiddenLine>
+            </a:ext>
+          </a:extLst>
+        </p:spPr>
+      </p:pic>
+      <p:cxnSp>
+        <p:nvCxnSpPr>
+          <p:cNvPr id="7" name="Straight Arrow Connector 6"/>
+          <p:cNvCxnSpPr/>
+          <p:nvPr/>
+        </p:nvCxnSpPr>
+        <p:spPr>
+          <a:xfrm flipH="1">
+            <a:off x="5306704" y="4517408"/>
+            <a:ext cx="1752600" cy="381000"/>
+          </a:xfrm>
+          <a:prstGeom prst="straightConnector1">
+            <a:avLst/>
+          </a:prstGeom>
+          <a:ln w="38100">
+            <a:solidFill>
+              <a:srgbClr val="FF0000"/>
+            </a:solidFill>
+            <a:tailEnd type="arrow"/>
+          </a:ln>
+        </p:spPr>
+        <p:style>
+          <a:lnRef idx="1">
+            <a:schemeClr val="accent1"/>
+          </a:lnRef>
+          <a:fillRef idx="0">
+            <a:schemeClr val="accent1"/>
+          </a:fillRef>
+          <a:effectRef idx="0">
+            <a:schemeClr val="accent1"/>
+          </a:effectRef>
+          <a:fontRef idx="minor">
+            <a:schemeClr val="tx1"/>
+          </a:fontRef>
+        </p:style>
+      </p:cxnSp>
+      <p:cxnSp>
+        <p:nvCxnSpPr>
+          <p:cNvPr id="10" name="Straight Arrow Connector 9"/>
+          <p:cNvCxnSpPr/>
+          <p:nvPr/>
+        </p:nvCxnSpPr>
+        <p:spPr>
+          <a:xfrm flipV="1">
+            <a:off x="685800" y="3048000"/>
+            <a:ext cx="533400" cy="457200"/>
+          </a:xfrm>
+          <a:prstGeom prst="straightConnector1">
+            <a:avLst/>
+          </a:prstGeom>
+          <a:ln w="38100">
+            <a:solidFill>
+              <a:srgbClr val="FF0000"/>
+            </a:solidFill>
+            <a:tailEnd type="arrow"/>
+          </a:ln>
+        </p:spPr>
+        <p:style>
+          <a:lnRef idx="1">
+            <a:schemeClr val="accent1"/>
+          </a:lnRef>
+          <a:fillRef idx="0">
+            <a:schemeClr val="accent1"/>
+          </a:fillRef>
+          <a:effectRef idx="0">
+            <a:schemeClr val="accent1"/>
+          </a:effectRef>
+          <a:fontRef idx="minor">
+            <a:schemeClr val="tx1"/>
+          </a:fontRef>
+        </p:style>
+      </p:cxnSp>
+    </p:spTree>
+    <p:extLst>
+      <p:ext uri="{BB962C8B-B14F-4D97-AF65-F5344CB8AC3E}">
+        <p14:creationId xmlns:p14="http://schemas.microsoft.com/office/powerpoint/2010/main" val="3879166904"/>
+      </p:ext>
+    </p:extLst>
+  </p:cSld>
+  <p:clrMapOvr>
+    <a:masterClrMapping/>
+  </p:clrMapOvr>
+  <p:timing>
+    <p:tnLst>
+      <p:par>
+        <p:cTn id="1" dur="indefinite" restart="never" nodeType="tmRoot"/>
+      </p:par>
+    </p:tnLst>
+  </p:timing>
+</p:sld>
+</file>
+
+<file path=ppt/slides/slide11.xml><?xml version="1.0" encoding="utf-8"?>
+<p:sld xmlns:a="http://schemas.openxmlformats.org/drawingml/2006/main" xmlns:r="http://schemas.openxmlformats.org/officeDocument/2006/relationships" xmlns:p="http://schemas.openxmlformats.org/presentationml/2006/main">
+  <p:cSld>
+    <p:spTree>
+      <p:nvGrpSpPr>
+        <p:cNvPr id="1" name=""/>
+        <p:cNvGrpSpPr/>
+        <p:nvPr/>
+      </p:nvGrpSpPr>
+      <p:grpSpPr>
+        <a:xfrm>
+          <a:off x="0" y="0"/>
+          <a:ext cx="0" cy="0"/>
+          <a:chOff x="0" y="0"/>
+          <a:chExt cx="0" cy="0"/>
+        </a:xfrm>
+      </p:grpSpPr>
+      <p:sp>
+        <p:nvSpPr>
+          <p:cNvPr id="2" name="Title 1"/>
+          <p:cNvSpPr>
+            <a:spLocks noGrp="1"/>
+          </p:cNvSpPr>
+          <p:nvPr>
+            <p:ph type="title"/>
+          </p:nvPr>
+        </p:nvSpPr>
+        <p:spPr>
+          <a:xfrm>
+            <a:off x="457200" y="76200"/>
+            <a:ext cx="7772400" cy="990600"/>
+          </a:xfrm>
+        </p:spPr>
+        <p:txBody>
+          <a:bodyPr/>
+          <a:lstStyle/>
+          <a:p>
+            <a:pPr algn="l"/>
+            <a:r>
+              <a:rPr lang="en-US" b="1" dirty="0" smtClean="0"/>
+              <a:t>Alt. Solution to Volunteer App</a:t>
+            </a:r>
+            <a:endParaRPr lang="en-US" b="1" dirty="0"/>
+          </a:p>
+        </p:txBody>
+      </p:sp>
+      <p:sp>
+        <p:nvSpPr>
+          <p:cNvPr id="3" name="Content Placeholder 2"/>
+          <p:cNvSpPr>
+            <a:spLocks noGrp="1"/>
+          </p:cNvSpPr>
+          <p:nvPr>
+            <p:ph idx="1"/>
+          </p:nvPr>
+        </p:nvSpPr>
+        <p:spPr>
+          <a:xfrm>
+            <a:off x="533400" y="1066800"/>
+            <a:ext cx="8153400" cy="4724400"/>
+          </a:xfrm>
+        </p:spPr>
+        <p:txBody>
+          <a:bodyPr>
+            <a:normAutofit/>
+          </a:bodyPr>
+          <a:lstStyle/>
+          <a:p>
+            <a:pPr>
+              <a:spcBef>
+                <a:spcPts val="0"/>
+              </a:spcBef>
+              <a:spcAft>
+                <a:spcPts val="1200"/>
+              </a:spcAft>
+            </a:pPr>
+            <a:r>
+              <a:rPr lang="en-US" sz="2800" dirty="0" smtClean="0"/>
+              <a:t>Volunteer Hours </a:t>
+            </a:r>
+            <a:r>
+              <a:rPr lang="en-US" sz="2800" dirty="0" smtClean="0"/>
+              <a:t>View with added Section Field</a:t>
+            </a:r>
+            <a:endParaRPr lang="en-US" sz="2800" dirty="0"/>
+          </a:p>
+        </p:txBody>
+      </p:sp>
+      <p:pic>
+        <p:nvPicPr>
+          <p:cNvPr id="1029" name="Picture 5"/>
+          <p:cNvPicPr>
+            <a:picLocks noChangeAspect="1" noChangeArrowheads="1"/>
+          </p:cNvPicPr>
+          <p:nvPr/>
+        </p:nvPicPr>
+        <p:blipFill>
+          <a:blip r:embed="rId2">
+            <a:extLst>
+              <a:ext uri="{28A0092B-C50C-407E-A947-70E740481C1C}">
+                <a14:useLocalDpi xmlns:a14="http://schemas.microsoft.com/office/drawing/2010/main" val="0"/>
+              </a:ext>
+            </a:extLst>
+          </a:blip>
+          <a:srcRect/>
+          <a:stretch>
+            <a:fillRect/>
+          </a:stretch>
+        </p:blipFill>
+        <p:spPr bwMode="auto">
+          <a:xfrm>
+            <a:off x="76201" y="1726494"/>
+            <a:ext cx="8991599" cy="5055306"/>
+          </a:xfrm>
+          <a:prstGeom prst="rect">
+            <a:avLst/>
+          </a:prstGeom>
+          <a:noFill/>
+          <a:ln>
+            <a:noFill/>
+          </a:ln>
+          <a:extLst>
+            <a:ext uri="{909E8E84-426E-40DD-AFC4-6F175D3DCCD1}">
+              <a14:hiddenFill xmlns:a14="http://schemas.microsoft.com/office/drawing/2010/main">
+                <a:solidFill>
+                  <a:schemeClr val="accent1"/>
+                </a:solidFill>
+              </a14:hiddenFill>
+            </a:ext>
+            <a:ext uri="{91240B29-F687-4F45-9708-019B960494DF}">
+              <a14:hiddenLine xmlns:a14="http://schemas.microsoft.com/office/drawing/2010/main" w="9525">
+                <a:solidFill>
+                  <a:schemeClr val="tx1"/>
+                </a:solidFill>
+                <a:miter lim="800000"/>
+                <a:headEnd/>
+                <a:tailEnd/>
+              </a14:hiddenLine>
+            </a:ext>
+          </a:extLst>
+        </p:spPr>
+      </p:pic>
+      <p:cxnSp>
+        <p:nvCxnSpPr>
+          <p:cNvPr id="5" name="Straight Arrow Connector 4"/>
+          <p:cNvCxnSpPr/>
+          <p:nvPr/>
+        </p:nvCxnSpPr>
+        <p:spPr>
+          <a:xfrm flipH="1">
+            <a:off x="4953000" y="3962400"/>
+            <a:ext cx="1752600" cy="672747"/>
+          </a:xfrm>
+          <a:prstGeom prst="straightConnector1">
+            <a:avLst/>
+          </a:prstGeom>
+          <a:ln w="38100">
+            <a:solidFill>
+              <a:srgbClr val="FF0000"/>
+            </a:solidFill>
+            <a:tailEnd type="arrow"/>
+          </a:ln>
+        </p:spPr>
+        <p:style>
+          <a:lnRef idx="1">
+            <a:schemeClr val="accent1"/>
+          </a:lnRef>
+          <a:fillRef idx="0">
+            <a:schemeClr val="accent1"/>
+          </a:fillRef>
+          <a:effectRef idx="0">
+            <a:schemeClr val="accent1"/>
+          </a:effectRef>
+          <a:fontRef idx="minor">
+            <a:schemeClr val="tx1"/>
+          </a:fontRef>
+        </p:style>
+      </p:cxnSp>
+    </p:spTree>
+    <p:extLst>
+      <p:ext uri="{BB962C8B-B14F-4D97-AF65-F5344CB8AC3E}">
+        <p14:creationId xmlns:p14="http://schemas.microsoft.com/office/powerpoint/2010/main" val="3285793026"/>
+      </p:ext>
+    </p:extLst>
+  </p:cSld>
+  <p:clrMapOvr>
+    <a:masterClrMapping/>
+  </p:clrMapOvr>
+  <p:timing>
+    <p:tnLst>
+      <p:par>
+        <p:cTn id="1" dur="indefinite" restart="never" nodeType="tmRoot"/>
+      </p:par>
+    </p:tnLst>
+  </p:timing>
+</p:sld>
+</file>
+
+<file path=ppt/slides/slide12.xml><?xml version="1.0" encoding="utf-8"?>
+<p:sld xmlns:a="http://schemas.openxmlformats.org/drawingml/2006/main" xmlns:r="http://schemas.openxmlformats.org/officeDocument/2006/relationships" xmlns:p="http://schemas.openxmlformats.org/presentationml/2006/main">
+  <p:cSld>
+    <p:spTree>
+      <p:nvGrpSpPr>
+        <p:cNvPr id="1" name=""/>
+        <p:cNvGrpSpPr/>
+        <p:nvPr/>
+      </p:nvGrpSpPr>
+      <p:grpSpPr>
+        <a:xfrm>
+          <a:off x="0" y="0"/>
+          <a:ext cx="0" cy="0"/>
+          <a:chOff x="0" y="0"/>
+          <a:chExt cx="0" cy="0"/>
+        </a:xfrm>
+      </p:grpSpPr>
+      <p:sp>
+        <p:nvSpPr>
+          <p:cNvPr id="2" name="Title 1"/>
+          <p:cNvSpPr>
+            <a:spLocks noGrp="1"/>
+          </p:cNvSpPr>
+          <p:nvPr>
+            <p:ph type="title"/>
+          </p:nvPr>
+        </p:nvSpPr>
+        <p:spPr>
+          <a:xfrm>
+            <a:off x="457200" y="76200"/>
+            <a:ext cx="7772400" cy="990600"/>
+          </a:xfrm>
+        </p:spPr>
+        <p:txBody>
+          <a:bodyPr/>
+          <a:lstStyle/>
+          <a:p>
+            <a:pPr algn="l"/>
+            <a:r>
+              <a:rPr lang="en-US" b="1" dirty="0" smtClean="0"/>
+              <a:t>Alt. Solution to Volunteer App</a:t>
+            </a:r>
+            <a:endParaRPr lang="en-US" b="1" dirty="0"/>
+          </a:p>
+        </p:txBody>
+      </p:sp>
+      <p:sp>
+        <p:nvSpPr>
+          <p:cNvPr id="3" name="Content Placeholder 2"/>
+          <p:cNvSpPr>
+            <a:spLocks noGrp="1"/>
+          </p:cNvSpPr>
+          <p:nvPr>
+            <p:ph idx="1"/>
+          </p:nvPr>
+        </p:nvSpPr>
+        <p:spPr>
+          <a:xfrm>
+            <a:off x="533400" y="1143000"/>
+            <a:ext cx="8153400" cy="4724400"/>
+          </a:xfrm>
+        </p:spPr>
+        <p:txBody>
+          <a:bodyPr>
+            <a:normAutofit/>
+          </a:bodyPr>
+          <a:lstStyle/>
+          <a:p>
+            <a:pPr>
+              <a:spcBef>
+                <a:spcPts val="0"/>
+              </a:spcBef>
+              <a:spcAft>
+                <a:spcPts val="1200"/>
+              </a:spcAft>
+            </a:pPr>
+            <a:r>
+              <a:rPr lang="en-US" sz="2800" dirty="0" smtClean="0"/>
+              <a:t>Returns to Home Page after Log Out</a:t>
+            </a:r>
+            <a:endParaRPr lang="en-US" sz="2800" dirty="0"/>
+          </a:p>
+        </p:txBody>
+      </p:sp>
+      <p:pic>
+        <p:nvPicPr>
+          <p:cNvPr id="4099" name="Picture 3"/>
+          <p:cNvPicPr>
+            <a:picLocks noChangeAspect="1" noChangeArrowheads="1"/>
+          </p:cNvPicPr>
+          <p:nvPr/>
+        </p:nvPicPr>
+        <p:blipFill>
+          <a:blip r:embed="rId2">
+            <a:extLst>
+              <a:ext uri="{28A0092B-C50C-407E-A947-70E740481C1C}">
+                <a14:useLocalDpi xmlns:a14="http://schemas.microsoft.com/office/drawing/2010/main" val="0"/>
+              </a:ext>
+            </a:extLst>
+          </a:blip>
+          <a:srcRect/>
+          <a:stretch>
+            <a:fillRect/>
+          </a:stretch>
+        </p:blipFill>
+        <p:spPr bwMode="auto">
+          <a:xfrm>
+            <a:off x="76200" y="1676400"/>
+            <a:ext cx="8991600" cy="5059242"/>
+          </a:xfrm>
+          <a:prstGeom prst="rect">
+            <a:avLst/>
+          </a:prstGeom>
+          <a:noFill/>
+          <a:ln>
+            <a:noFill/>
+          </a:ln>
+          <a:extLst>
+            <a:ext uri="{909E8E84-426E-40DD-AFC4-6F175D3DCCD1}">
+              <a14:hiddenFill xmlns:a14="http://schemas.microsoft.com/office/drawing/2010/main">
+                <a:solidFill>
+                  <a:schemeClr val="accent1"/>
+                </a:solidFill>
+              </a14:hiddenFill>
+            </a:ext>
+            <a:ext uri="{91240B29-F687-4F45-9708-019B960494DF}">
+              <a14:hiddenLine xmlns:a14="http://schemas.microsoft.com/office/drawing/2010/main" w="9525">
+                <a:solidFill>
+                  <a:schemeClr val="tx1"/>
+                </a:solidFill>
+                <a:miter lim="800000"/>
+                <a:headEnd/>
+                <a:tailEnd/>
+              </a14:hiddenLine>
+            </a:ext>
+          </a:extLst>
+        </p:spPr>
+      </p:pic>
+    </p:spTree>
+    <p:extLst>
+      <p:ext uri="{BB962C8B-B14F-4D97-AF65-F5344CB8AC3E}">
+        <p14:creationId xmlns:p14="http://schemas.microsoft.com/office/powerpoint/2010/main" val="2614761421"/>
+      </p:ext>
+    </p:extLst>
+  </p:cSld>
+  <p:clrMapOvr>
+    <a:masterClrMapping/>
+  </p:clrMapOvr>
+  <p:timing>
+    <p:tnLst>
+      <p:par>
+        <p:cTn id="1" dur="indefinite" restart="never" nodeType="tmRoot"/>
+      </p:par>
+    </p:tnLst>
+  </p:timing>
+</p:sld>
+</file>
+
+<file path=ppt/slides/slide13.xml><?xml version="1.0" encoding="utf-8"?>
 <p:sld xmlns:a="http://schemas.openxmlformats.org/drawingml/2006/main" xmlns:r="http://schemas.openxmlformats.org/officeDocument/2006/relationships" xmlns:p="http://schemas.openxmlformats.org/presentationml/2006/main">
   <p:cSld>
     <p:spTree>
@@ -12573,7 +13559,7 @@
 </p:sld>
 </file>
 
-<file path=ppt/slides/slide11.xml><?xml version="1.0" encoding="utf-8"?>
+<file path=ppt/slides/slide14.xml><?xml version="1.0" encoding="utf-8"?>
 <p:sld xmlns:a="http://schemas.openxmlformats.org/drawingml/2006/main" xmlns:r="http://schemas.openxmlformats.org/officeDocument/2006/relationships" xmlns:p="http://schemas.openxmlformats.org/presentationml/2006/main">
   <p:cSld>
     <p:spTree>
@@ -12648,7 +13634,11 @@
             </a:pPr>
             <a:r>
               <a:rPr lang="en-US" dirty="0" smtClean="0"/>
-              <a:t>Continue customizing site content with theme</a:t>
+              <a:t>Continue customizing site content with </a:t>
+            </a:r>
+            <a:r>
+              <a:rPr lang="en-US" dirty="0" smtClean="0"/>
+              <a:t>theme</a:t>
             </a:r>
           </a:p>
           <a:p>
@@ -12659,7 +13649,27 @@
             </a:pPr>
             <a:r>
               <a:rPr lang="en-US" dirty="0" smtClean="0"/>
-              <a:t>Update Volunteer app code to PHP 7.2</a:t>
+              <a:t>Look into building a plugin for Volunteer App</a:t>
+            </a:r>
+            <a:endParaRPr lang="en-US" dirty="0" smtClean="0"/>
+          </a:p>
+          <a:p>
+            <a:pPr>
+              <a:spcBef>
+                <a:spcPts val="1200"/>
+              </a:spcBef>
+            </a:pPr>
+            <a:r>
+              <a:rPr lang="en-US" dirty="0" smtClean="0"/>
+              <a:t>Update Volunteer </a:t>
+            </a:r>
+            <a:r>
+              <a:rPr lang="en-US" dirty="0" smtClean="0"/>
+              <a:t>App </a:t>
+            </a:r>
+            <a:r>
+              <a:rPr lang="en-US" dirty="0" smtClean="0"/>
+              <a:t>code to PHP 7.2</a:t>
             </a:r>
           </a:p>
           <a:p>
@@ -12708,7 +13718,7 @@
 </p:sld>
 </file>
 
-<file path=ppt/slides/slide12.xml><?xml version="1.0" encoding="utf-8"?>
+<file path=ppt/slides/slide15.xml><?xml version="1.0" encoding="utf-8"?>
 <p:sld xmlns:a="http://schemas.openxmlformats.org/drawingml/2006/main" xmlns:r="http://schemas.openxmlformats.org/officeDocument/2006/relationships" xmlns:p="http://schemas.openxmlformats.org/presentationml/2006/main">
   <p:cSld>
     <p:spTree>
@@ -12802,11 +13812,17 @@
             <p:ph type="title"/>
           </p:nvPr>
         </p:nvSpPr>
-        <p:spPr/>
+        <p:spPr>
+          <a:xfrm>
+            <a:off x="457200" y="76200"/>
+            <a:ext cx="8229600" cy="1143000"/>
+          </a:xfrm>
+        </p:spPr>
         <p:txBody>
           <a:bodyPr/>
           <a:lstStyle/>
           <a:p>
+            <a:pPr algn="l"/>
             <a:r>
               <a:rPr lang="en-US" b="1" dirty="0" smtClean="0"/>
               <a:t>Overview</a:t>
@@ -12825,10 +13841,15 @@
             <p:ph idx="1"/>
           </p:nvPr>
         </p:nvSpPr>
-        <p:spPr/>
+        <p:spPr>
+          <a:xfrm>
+            <a:off x="457200" y="1524000"/>
+            <a:ext cx="8229600" cy="4876800"/>
+          </a:xfrm>
+        </p:spPr>
         <p:txBody>
           <a:bodyPr>
-            <a:normAutofit/>
+            <a:normAutofit lnSpcReduction="10000"/>
           </a:bodyPr>
           <a:lstStyle/>
           <a:p>
@@ -12840,8 +13861,21 @@
           <a:p>
             <a:r>
               <a:rPr lang="en-US" sz="3600" dirty="0" smtClean="0"/>
-              <a:t>WordPress Theme Selection</a:t>
+              <a:t>How WordPress Works</a:t>
             </a:r>
+          </a:p>
+          <a:p>
+            <a:r>
+              <a:rPr lang="en-US" sz="3600" dirty="0" smtClean="0"/>
+              <a:t>Selected Theme for Main Site</a:t>
+            </a:r>
+          </a:p>
+          <a:p>
+            <a:r>
+              <a:rPr lang="en-US" sz="3600" dirty="0" smtClean="0"/>
+              <a:t>Volunteer App</a:t>
+            </a:r>
+            <a:endParaRPr lang="en-US" sz="3600" dirty="0" smtClean="0"/>
           </a:p>
           <a:p>
             <a:r>
@@ -13119,7 +14153,7 @@
             <a:pPr algn="l"/>
             <a:r>
               <a:rPr lang="en-US" b="1" dirty="0" smtClean="0"/>
-              <a:t>WP Theme Selection</a:t>
+              <a:t>How WordPress Works</a:t>
             </a:r>
             <a:endParaRPr lang="en-US" b="1" dirty="0"/>
           </a:p>
@@ -13137,7 +14171,7 @@
         </p:nvSpPr>
         <p:spPr>
           <a:xfrm>
-            <a:off x="533400" y="1066800"/>
+            <a:off x="533400" y="990600"/>
             <a:ext cx="8153400" cy="4724400"/>
           </a:xfrm>
         </p:spPr>
@@ -13152,12 +14186,40 @@
                 <a:spcPts val="0"/>
               </a:spcBef>
               <a:spcAft>
-                <a:spcPts val="1200"/>
+                <a:spcPts val="300"/>
               </a:spcAft>
             </a:pPr>
             <a:r>
               <a:rPr lang="en-US" dirty="0" smtClean="0"/>
-              <a:t>Krystal – Free WP Theme</a:t>
+              <a:t>WordPress Core</a:t>
+            </a:r>
+          </a:p>
+          <a:p>
+            <a:pPr lvl="1">
+              <a:spcBef>
+                <a:spcPts val="0"/>
+              </a:spcBef>
+              <a:spcAft>
+                <a:spcPts val="300"/>
+              </a:spcAft>
+            </a:pPr>
+            <a:r>
+              <a:rPr lang="en-US" dirty="0" smtClean="0"/>
+              <a:t>Custom Appearance (Themes)</a:t>
+            </a:r>
+          </a:p>
+          <a:p>
+            <a:pPr lvl="1">
+              <a:spcBef>
+                <a:spcPts val="0"/>
+              </a:spcBef>
+              <a:spcAft>
+                <a:spcPts val="300"/>
+              </a:spcAft>
+            </a:pPr>
+            <a:r>
+              <a:rPr lang="en-US" dirty="0" smtClean="0"/>
+              <a:t>Custom Features &amp; Functionality (Plugins)</a:t>
             </a:r>
             <a:endParaRPr lang="en-US" dirty="0"/>
           </a:p>
@@ -13165,14 +14227,14 @@
       </p:sp>
       <p:pic>
         <p:nvPicPr>
-          <p:cNvPr id="1026" name="Picture 2"/>
+          <p:cNvPr id="5" name="Picture 2"/>
           <p:cNvPicPr>
             <a:picLocks noChangeAspect="1" noChangeArrowheads="1"/>
           </p:cNvPicPr>
           <p:nvPr/>
         </p:nvPicPr>
         <p:blipFill>
-          <a:blip r:embed="rId2">
+          <a:blip r:embed="rId3">
             <a:extLst>
               <a:ext uri="{28A0092B-C50C-407E-A947-70E740481C1C}">
                 <a14:useLocalDpi xmlns:a14="http://schemas.microsoft.com/office/drawing/2010/main" val="0"/>
@@ -13186,8 +14248,8 @@
         </p:blipFill>
         <p:spPr bwMode="auto">
           <a:xfrm>
-            <a:off x="122635" y="1676400"/>
-            <a:ext cx="8945165" cy="5029200"/>
+            <a:off x="1219201" y="2579205"/>
+            <a:ext cx="6553200" cy="4202595"/>
           </a:xfrm>
           <a:prstGeom prst="rect">
             <a:avLst/>
@@ -13267,7 +14329,7 @@
         <p:spPr>
           <a:xfrm>
             <a:off x="457200" y="76200"/>
-            <a:ext cx="7772400" cy="1143000"/>
+            <a:ext cx="7772400" cy="990600"/>
           </a:xfrm>
         </p:spPr>
         <p:txBody>
@@ -13277,106 +14339,65 @@
             <a:pPr algn="l"/>
             <a:r>
               <a:rPr lang="en-US" b="1" dirty="0" smtClean="0"/>
-              <a:t>Available Plugins &amp; Limits</a:t>
+              <a:t>Existing Website</a:t>
             </a:r>
             <a:endParaRPr lang="en-US" b="1" dirty="0"/>
           </a:p>
         </p:txBody>
       </p:sp>
-      <p:sp>
-        <p:nvSpPr>
-          <p:cNvPr id="3" name="Content Placeholder 2"/>
-          <p:cNvSpPr>
-            <a:spLocks noGrp="1"/>
-          </p:cNvSpPr>
-          <p:nvPr>
-            <p:ph idx="1"/>
-          </p:nvPr>
-        </p:nvSpPr>
-        <p:spPr>
+      <p:pic>
+        <p:nvPicPr>
+          <p:cNvPr id="3076" name="Picture 4"/>
+          <p:cNvPicPr>
+            <a:picLocks noChangeAspect="1" noChangeArrowheads="1"/>
+          </p:cNvPicPr>
+          <p:nvPr/>
+        </p:nvPicPr>
+        <p:blipFill>
+          <a:blip r:embed="rId2">
+            <a:extLst>
+              <a:ext uri="{28A0092B-C50C-407E-A947-70E740481C1C}">
+                <a14:useLocalDpi xmlns:a14="http://schemas.microsoft.com/office/drawing/2010/main" val="0"/>
+              </a:ext>
+            </a:extLst>
+          </a:blip>
+          <a:srcRect/>
+          <a:stretch>
+            <a:fillRect/>
+          </a:stretch>
+        </p:blipFill>
+        <p:spPr bwMode="auto">
           <a:xfrm>
-            <a:off x="533400" y="1600200"/>
-            <a:ext cx="8153400" cy="4724400"/>
+            <a:off x="1295400" y="1027849"/>
+            <a:ext cx="6400800" cy="5753951"/>
           </a:xfrm>
+          <a:prstGeom prst="rect">
+            <a:avLst/>
+          </a:prstGeom>
+          <a:noFill/>
+          <a:ln w="9525">
+            <a:solidFill>
+              <a:schemeClr val="tx1"/>
+            </a:solidFill>
+            <a:miter lim="800000"/>
+            <a:headEnd/>
+            <a:tailEnd/>
+          </a:ln>
+          <a:extLst>
+            <a:ext uri="{909E8E84-426E-40DD-AFC4-6F175D3DCCD1}">
+              <a14:hiddenFill xmlns:a14="http://schemas.microsoft.com/office/drawing/2010/main">
+                <a:solidFill>
+                  <a:schemeClr val="accent1"/>
+                </a:solidFill>
+              </a14:hiddenFill>
+            </a:ext>
+          </a:extLst>
         </p:spPr>
-        <p:txBody>
-          <a:bodyPr>
-            <a:normAutofit/>
-          </a:bodyPr>
-          <a:lstStyle/>
-          <a:p>
-            <a:pPr>
-              <a:spcBef>
-                <a:spcPts val="0"/>
-              </a:spcBef>
-              <a:spcAft>
-                <a:spcPts val="1200"/>
-              </a:spcAft>
-            </a:pPr>
-            <a:r>
-              <a:rPr lang="en-US" dirty="0" smtClean="0"/>
-              <a:t>Most plugins use the built-in WP Database</a:t>
-            </a:r>
-          </a:p>
-          <a:p>
-            <a:pPr>
-              <a:spcBef>
-                <a:spcPts val="0"/>
-              </a:spcBef>
-              <a:spcAft>
-                <a:spcPts val="1200"/>
-              </a:spcAft>
-            </a:pPr>
-            <a:r>
-              <a:rPr lang="en-US" dirty="0" smtClean="0"/>
-              <a:t>Non-customizable database tables</a:t>
-            </a:r>
-          </a:p>
-          <a:p>
-            <a:pPr>
-              <a:spcBef>
-                <a:spcPts val="0"/>
-              </a:spcBef>
-              <a:spcAft>
-                <a:spcPts val="1200"/>
-              </a:spcAft>
-            </a:pPr>
-            <a:r>
-              <a:rPr lang="en-US" dirty="0" smtClean="0"/>
-              <a:t>Will not allow migration of the app DB tables</a:t>
-            </a:r>
-          </a:p>
-          <a:p>
-            <a:pPr lvl="1">
-              <a:spcBef>
-                <a:spcPts val="0"/>
-              </a:spcBef>
-              <a:spcAft>
-                <a:spcPts val="1200"/>
-              </a:spcAft>
-            </a:pPr>
-            <a:r>
-              <a:rPr lang="en-US" dirty="0" smtClean="0"/>
-              <a:t>Negative impact to Volunteer App &amp; Reports App</a:t>
-            </a:r>
-          </a:p>
-          <a:p>
-            <a:pPr>
-              <a:spcBef>
-                <a:spcPts val="0"/>
-              </a:spcBef>
-              <a:spcAft>
-                <a:spcPts val="1200"/>
-              </a:spcAft>
-            </a:pPr>
-            <a:endParaRPr lang="en-US" dirty="0"/>
-          </a:p>
-        </p:txBody>
-      </p:sp>
+      </p:pic>
     </p:spTree>
     <p:extLst>
       <p:ext uri="{BB962C8B-B14F-4D97-AF65-F5344CB8AC3E}">
-        <p14:creationId xmlns:p14="http://schemas.microsoft.com/office/powerpoint/2010/main" val="2344059427"/>
+        <p14:creationId xmlns:p14="http://schemas.microsoft.com/office/powerpoint/2010/main" val="65064513"/>
       </p:ext>
     </p:extLst>
   </p:cSld>
@@ -13423,7 +14444,7 @@
         <p:spPr>
           <a:xfrm>
             <a:off x="457200" y="76200"/>
-            <a:ext cx="7772400" cy="1143000"/>
+            <a:ext cx="7772400" cy="990600"/>
           </a:xfrm>
         </p:spPr>
         <p:txBody>
@@ -13433,53 +14454,15 @@
             <a:pPr algn="l"/>
             <a:r>
               <a:rPr lang="en-US" b="1" dirty="0" smtClean="0"/>
-              <a:t>Alt. Solution to Volunteer App</a:t>
+              <a:t>Selected WP Theme</a:t>
             </a:r>
             <a:endParaRPr lang="en-US" b="1" dirty="0"/>
-          </a:p>
-        </p:txBody>
-      </p:sp>
-      <p:sp>
-        <p:nvSpPr>
-          <p:cNvPr id="3" name="Content Placeholder 2"/>
-          <p:cNvSpPr>
-            <a:spLocks noGrp="1"/>
-          </p:cNvSpPr>
-          <p:nvPr>
-            <p:ph idx="1"/>
-          </p:nvPr>
-        </p:nvSpPr>
-        <p:spPr>
-          <a:xfrm>
-            <a:off x="457200" y="1066800"/>
-            <a:ext cx="8153400" cy="4724400"/>
-          </a:xfrm>
-        </p:spPr>
-        <p:txBody>
-          <a:bodyPr>
-            <a:normAutofit/>
-          </a:bodyPr>
-          <a:lstStyle/>
-          <a:p>
-            <a:pPr>
-              <a:spcBef>
-                <a:spcPts val="0"/>
-              </a:spcBef>
-              <a:spcAft>
-                <a:spcPts val="1200"/>
-              </a:spcAft>
-            </a:pPr>
-            <a:r>
-              <a:rPr lang="en-US" dirty="0" smtClean="0"/>
-              <a:t>Embedded Login Page on Example Theme</a:t>
-            </a:r>
-            <a:endParaRPr lang="en-US" dirty="0"/>
           </a:p>
         </p:txBody>
       </p:sp>
       <p:pic>
         <p:nvPicPr>
-          <p:cNvPr id="2050" name="Picture 2"/>
+          <p:cNvPr id="3074" name="Picture 2"/>
           <p:cNvPicPr>
             <a:picLocks noChangeAspect="1" noChangeArrowheads="1"/>
           </p:cNvPicPr>
@@ -13500,8 +14483,8 @@
         </p:blipFill>
         <p:spPr bwMode="auto">
           <a:xfrm>
-            <a:off x="76200" y="1737204"/>
-            <a:ext cx="8972550" cy="5044596"/>
+            <a:off x="809625" y="942583"/>
+            <a:ext cx="7038975" cy="5882434"/>
           </a:xfrm>
           <a:prstGeom prst="rect">
             <a:avLst/>
@@ -13534,7 +14517,7 @@
     </p:spTree>
     <p:extLst>
       <p:ext uri="{BB962C8B-B14F-4D97-AF65-F5344CB8AC3E}">
-        <p14:creationId xmlns:p14="http://schemas.microsoft.com/office/powerpoint/2010/main" val="1397217061"/>
+        <p14:creationId xmlns:p14="http://schemas.microsoft.com/office/powerpoint/2010/main" val="2337472619"/>
       </p:ext>
     </p:extLst>
   </p:cSld>
@@ -13591,7 +14574,7 @@
             <a:pPr algn="l"/>
             <a:r>
               <a:rPr lang="en-US" b="1" dirty="0" smtClean="0"/>
-              <a:t>Alt. Solution to Volunteer App</a:t>
+              <a:t>Existing Volunteer App</a:t>
             </a:r>
             <a:endParaRPr lang="en-US" b="1" dirty="0"/>
           </a:p>
@@ -13609,7 +14592,7 @@
         </p:nvSpPr>
         <p:spPr>
           <a:xfrm>
-            <a:off x="533400" y="1143000"/>
+            <a:off x="533400" y="1066800"/>
             <a:ext cx="8153400" cy="4724400"/>
           </a:xfrm>
         </p:spPr>
@@ -13628,16 +14611,16 @@
               </a:spcAft>
             </a:pPr>
             <a:r>
-              <a:rPr lang="en-US" sz="2800" dirty="0" smtClean="0"/>
-              <a:t>Added Section Field for Hardman Farm &amp; SGW</a:t>
+              <a:rPr lang="en-US" dirty="0" smtClean="0"/>
+              <a:t>Stand-alone app linked from WP site</a:t>
             </a:r>
-            <a:endParaRPr lang="en-US" sz="2800" dirty="0"/>
+            <a:endParaRPr lang="en-US" dirty="0"/>
           </a:p>
         </p:txBody>
       </p:sp>
       <p:pic>
         <p:nvPicPr>
-          <p:cNvPr id="3074" name="Picture 2"/>
+          <p:cNvPr id="2050" name="Picture 2"/>
           <p:cNvPicPr>
             <a:picLocks noChangeAspect="1" noChangeArrowheads="1"/>
           </p:cNvPicPr>
@@ -13658,15 +14641,20 @@
         </p:blipFill>
         <p:spPr bwMode="auto">
           <a:xfrm>
-            <a:off x="76200" y="1726495"/>
-            <a:ext cx="8991600" cy="5055306"/>
+            <a:off x="152400" y="1837054"/>
+            <a:ext cx="5553075" cy="3420746"/>
           </a:xfrm>
           <a:prstGeom prst="rect">
             <a:avLst/>
           </a:prstGeom>
           <a:noFill/>
-          <a:ln>
-            <a:noFill/>
+          <a:ln w="9525">
+            <a:solidFill>
+              <a:schemeClr val="tx1"/>
+            </a:solidFill>
+            <a:miter lim="800000"/>
+            <a:headEnd/>
+            <a:tailEnd/>
           </a:ln>
           <a:extLst>
             <a:ext uri="{909E8E84-426E-40DD-AFC4-6F175D3DCCD1}">
@@ -13676,15 +14664,54 @@
                 </a:solidFill>
               </a14:hiddenFill>
             </a:ext>
-            <a:ext uri="{91240B29-F687-4F45-9708-019B960494DF}">
-              <a14:hiddenLine xmlns:a14="http://schemas.microsoft.com/office/drawing/2010/main" w="9525">
+          </a:extLst>
+        </p:spPr>
+      </p:pic>
+      <p:pic>
+        <p:nvPicPr>
+          <p:cNvPr id="2051" name="Picture 3"/>
+          <p:cNvPicPr>
+            <a:picLocks noChangeAspect="1" noChangeArrowheads="1"/>
+          </p:cNvPicPr>
+          <p:nvPr/>
+        </p:nvPicPr>
+        <p:blipFill>
+          <a:blip r:embed="rId3">
+            <a:extLst>
+              <a:ext uri="{28A0092B-C50C-407E-A947-70E740481C1C}">
+                <a14:useLocalDpi xmlns:a14="http://schemas.microsoft.com/office/drawing/2010/main" val="0"/>
+              </a:ext>
+            </a:extLst>
+          </a:blip>
+          <a:srcRect/>
+          <a:stretch>
+            <a:fillRect/>
+          </a:stretch>
+        </p:blipFill>
+        <p:spPr bwMode="auto">
+          <a:xfrm>
+            <a:off x="3429000" y="3386774"/>
+            <a:ext cx="5601061" cy="3302326"/>
+          </a:xfrm>
+          <a:prstGeom prst="rect">
+            <a:avLst/>
+          </a:prstGeom>
+          <a:noFill/>
+          <a:ln w="9525">
+            <a:solidFill>
+              <a:schemeClr val="tx1"/>
+            </a:solidFill>
+            <a:miter lim="800000"/>
+            <a:headEnd/>
+            <a:tailEnd/>
+          </a:ln>
+          <a:extLst>
+            <a:ext uri="{909E8E84-426E-40DD-AFC4-6F175D3DCCD1}">
+              <a14:hiddenFill xmlns:a14="http://schemas.microsoft.com/office/drawing/2010/main">
                 <a:solidFill>
-                  <a:schemeClr val="tx1"/>
+                  <a:schemeClr val="accent1"/>
                 </a:solidFill>
-                <a:miter lim="800000"/>
-                <a:headEnd/>
-                <a:tailEnd/>
-              </a14:hiddenLine>
+              </a14:hiddenFill>
             </a:ext>
           </a:extLst>
         </p:spPr>
@@ -13692,7 +14719,7 @@
     </p:spTree>
     <p:extLst>
       <p:ext uri="{BB962C8B-B14F-4D97-AF65-F5344CB8AC3E}">
-        <p14:creationId xmlns:p14="http://schemas.microsoft.com/office/powerpoint/2010/main" val="3879166904"/>
+        <p14:creationId xmlns:p14="http://schemas.microsoft.com/office/powerpoint/2010/main" val="1130974928"/>
       </p:ext>
     </p:extLst>
   </p:cSld>
@@ -13749,7 +14776,7 @@
             <a:pPr algn="l"/>
             <a:r>
               <a:rPr lang="en-US" b="1" dirty="0" smtClean="0"/>
-              <a:t>Alt. Solution to Volunteer App</a:t>
+              <a:t>Available Plugins &amp; Limits</a:t>
             </a:r>
             <a:endParaRPr lang="en-US" b="1" dirty="0"/>
           </a:p>
@@ -13767,7 +14794,7 @@
         </p:nvSpPr>
         <p:spPr>
           <a:xfrm>
-            <a:off x="533400" y="1143000"/>
+            <a:off x="533400" y="1524000"/>
             <a:ext cx="8153400" cy="4724400"/>
           </a:xfrm>
         </p:spPr>
@@ -13786,23 +14813,83 @@
               </a:spcAft>
             </a:pPr>
             <a:r>
-              <a:rPr lang="en-US" sz="2800" dirty="0" smtClean="0"/>
-              <a:t>Volunteer Hours View</a:t>
+              <a:rPr lang="en-US" dirty="0"/>
+              <a:t>P</a:t>
             </a:r>
-            <a:endParaRPr lang="en-US" sz="2800" dirty="0"/>
+            <a:r>
+              <a:rPr lang="en-US" dirty="0" smtClean="0"/>
+              <a:t>lugins </a:t>
+            </a:r>
+            <a:r>
+              <a:rPr lang="en-US" dirty="0" smtClean="0"/>
+              <a:t>use the built-in WP Database</a:t>
+            </a:r>
+          </a:p>
+          <a:p>
+            <a:pPr>
+              <a:spcBef>
+                <a:spcPts val="0"/>
+              </a:spcBef>
+              <a:spcAft>
+                <a:spcPts val="1200"/>
+              </a:spcAft>
+            </a:pPr>
+            <a:r>
+              <a:rPr lang="en-US" dirty="0" smtClean="0"/>
+              <a:t>Non-customizable database tables</a:t>
+            </a:r>
+          </a:p>
+          <a:p>
+            <a:pPr>
+              <a:spcBef>
+                <a:spcPts val="0"/>
+              </a:spcBef>
+              <a:spcAft>
+                <a:spcPts val="1200"/>
+              </a:spcAft>
+            </a:pPr>
+            <a:r>
+              <a:rPr lang="en-US" dirty="0" smtClean="0"/>
+              <a:t>Will not allow migration of the app DB tables</a:t>
+            </a:r>
+          </a:p>
+          <a:p>
+            <a:pPr lvl="1">
+              <a:spcBef>
+                <a:spcPts val="0"/>
+              </a:spcBef>
+              <a:spcAft>
+                <a:spcPts val="1200"/>
+              </a:spcAft>
+            </a:pPr>
+            <a:r>
+              <a:rPr lang="en-US" dirty="0" smtClean="0"/>
+              <a:t>Negative impact to Volunteer App &amp; Reports App</a:t>
+            </a:r>
+          </a:p>
+          <a:p>
+            <a:pPr>
+              <a:spcBef>
+                <a:spcPts val="0"/>
+              </a:spcBef>
+              <a:spcAft>
+                <a:spcPts val="1200"/>
+              </a:spcAft>
+            </a:pPr>
+            <a:endParaRPr lang="en-US" dirty="0"/>
           </a:p>
         </p:txBody>
       </p:sp>
       <p:pic>
         <p:nvPicPr>
-          <p:cNvPr id="1029" name="Picture 5"/>
+          <p:cNvPr id="1026" name="Picture 2"/>
           <p:cNvPicPr>
             <a:picLocks noChangeAspect="1" noChangeArrowheads="1"/>
           </p:cNvPicPr>
           <p:nvPr/>
         </p:nvPicPr>
         <p:blipFill>
-          <a:blip r:embed="rId2">
+          <a:blip r:embed="rId3">
             <a:extLst>
               <a:ext uri="{28A0092B-C50C-407E-A947-70E740481C1C}">
                 <a14:useLocalDpi xmlns:a14="http://schemas.microsoft.com/office/drawing/2010/main" val="0"/>
@@ -13816,8 +14903,8 @@
         </p:blipFill>
         <p:spPr bwMode="auto">
           <a:xfrm>
-            <a:off x="76201" y="1726494"/>
-            <a:ext cx="8991599" cy="5055306"/>
+            <a:off x="5562600" y="4427468"/>
+            <a:ext cx="3314700" cy="2125732"/>
           </a:xfrm>
           <a:prstGeom prst="rect">
             <a:avLst/>
@@ -13850,7 +14937,7 @@
     </p:spTree>
     <p:extLst>
       <p:ext uri="{BB962C8B-B14F-4D97-AF65-F5344CB8AC3E}">
-        <p14:creationId xmlns:p14="http://schemas.microsoft.com/office/powerpoint/2010/main" val="3285793026"/>
+        <p14:creationId xmlns:p14="http://schemas.microsoft.com/office/powerpoint/2010/main" val="2344059427"/>
       </p:ext>
     </p:extLst>
   </p:cSld>
@@ -13897,7 +14984,7 @@
         <p:spPr>
           <a:xfrm>
             <a:off x="457200" y="76200"/>
-            <a:ext cx="7772400" cy="1143000"/>
+            <a:ext cx="7772400" cy="990600"/>
           </a:xfrm>
         </p:spPr>
         <p:txBody>
@@ -13925,7 +15012,7 @@
         </p:nvSpPr>
         <p:spPr>
           <a:xfrm>
-            <a:off x="533400" y="1143000"/>
+            <a:off x="457200" y="1066800"/>
             <a:ext cx="8153400" cy="4724400"/>
           </a:xfrm>
         </p:spPr>
@@ -13944,23 +15031,23 @@
               </a:spcAft>
             </a:pPr>
             <a:r>
-              <a:rPr lang="en-US" sz="2800" dirty="0" smtClean="0"/>
-              <a:t>Returns to Home Page after Log Out</a:t>
+              <a:rPr lang="en-US" dirty="0" smtClean="0"/>
+              <a:t>Embedded Login Page on Example Theme</a:t>
             </a:r>
-            <a:endParaRPr lang="en-US" sz="2800" dirty="0"/>
+            <a:endParaRPr lang="en-US" dirty="0"/>
           </a:p>
         </p:txBody>
       </p:sp>
       <p:pic>
         <p:nvPicPr>
-          <p:cNvPr id="4099" name="Picture 3"/>
+          <p:cNvPr id="2050" name="Picture 2"/>
           <p:cNvPicPr>
             <a:picLocks noChangeAspect="1" noChangeArrowheads="1"/>
           </p:cNvPicPr>
           <p:nvPr/>
         </p:nvPicPr>
         <p:blipFill>
-          <a:blip r:embed="rId2">
+          <a:blip r:embed="rId3">
             <a:extLst>
               <a:ext uri="{28A0092B-C50C-407E-A947-70E740481C1C}">
                 <a14:useLocalDpi xmlns:a14="http://schemas.microsoft.com/office/drawing/2010/main" val="0"/>
@@ -13974,8 +15061,8 @@
         </p:blipFill>
         <p:spPr bwMode="auto">
           <a:xfrm>
-            <a:off x="76200" y="1676400"/>
-            <a:ext cx="8991600" cy="5059242"/>
+            <a:off x="76200" y="1737204"/>
+            <a:ext cx="8972550" cy="5044596"/>
           </a:xfrm>
           <a:prstGeom prst="rect">
             <a:avLst/>
@@ -14008,7 +15095,7 @@
     </p:spTree>
     <p:extLst>
       <p:ext uri="{BB962C8B-B14F-4D97-AF65-F5344CB8AC3E}">
-        <p14:creationId xmlns:p14="http://schemas.microsoft.com/office/powerpoint/2010/main" val="2614761421"/>
+        <p14:creationId xmlns:p14="http://schemas.microsoft.com/office/powerpoint/2010/main" val="1397217061"/>
       </p:ext>
     </p:extLst>
   </p:cSld>

</xml_diff>